<commit_message>
Added introduction to the key elements of penny lane.
</commit_message>
<xml_diff>
--- a/docs/PennyLane.pptx
+++ b/docs/PennyLane.pptx
@@ -13,15 +13,16 @@
     <p:sldId id="264" r:id="rId7"/>
     <p:sldId id="275" r:id="rId8"/>
     <p:sldId id="276" r:id="rId9"/>
-    <p:sldId id="258" r:id="rId10"/>
-    <p:sldId id="261" r:id="rId11"/>
-    <p:sldId id="263" r:id="rId12"/>
-    <p:sldId id="262" r:id="rId13"/>
-    <p:sldId id="259" r:id="rId14"/>
-    <p:sldId id="265" r:id="rId15"/>
-    <p:sldId id="266" r:id="rId16"/>
-    <p:sldId id="270" r:id="rId17"/>
-    <p:sldId id="271" r:id="rId18"/>
+    <p:sldId id="279" r:id="rId10"/>
+    <p:sldId id="280" r:id="rId11"/>
+    <p:sldId id="261" r:id="rId12"/>
+    <p:sldId id="263" r:id="rId13"/>
+    <p:sldId id="262" r:id="rId14"/>
+    <p:sldId id="259" r:id="rId15"/>
+    <p:sldId id="265" r:id="rId16"/>
+    <p:sldId id="266" r:id="rId17"/>
+    <p:sldId id="270" r:id="rId18"/>
+    <p:sldId id="271" r:id="rId19"/>
   </p:sldIdLst>
   <p:sldSz cx="12192000" cy="6858000"/>
   <p:notesSz cx="6858000" cy="9144000"/>
@@ -1352,7 +1353,7 @@
           <a:p>
             <a:fld id="{90C2BA37-70E4-4B36-A435-F0D9B3E8FEAF}" type="datetimeFigureOut">
               <a:rPr lang="he-IL" smtClean="0"/>
-              <a:t>י"א/תמוז/תש"פ</a:t>
+              <a:t>י"ב/תמוז/תש"פ</a:t>
             </a:fld>
             <a:endParaRPr lang="he-IL"/>
           </a:p>
@@ -1552,7 +1553,7 @@
           <a:p>
             <a:fld id="{90C2BA37-70E4-4B36-A435-F0D9B3E8FEAF}" type="datetimeFigureOut">
               <a:rPr lang="he-IL" smtClean="0"/>
-              <a:t>י"א/תמוז/תש"פ</a:t>
+              <a:t>י"ב/תמוז/תש"פ</a:t>
             </a:fld>
             <a:endParaRPr lang="he-IL"/>
           </a:p>
@@ -1762,7 +1763,7 @@
           <a:p>
             <a:fld id="{90C2BA37-70E4-4B36-A435-F0D9B3E8FEAF}" type="datetimeFigureOut">
               <a:rPr lang="he-IL" smtClean="0"/>
-              <a:t>י"א/תמוז/תש"פ</a:t>
+              <a:t>י"ב/תמוז/תש"פ</a:t>
             </a:fld>
             <a:endParaRPr lang="he-IL"/>
           </a:p>
@@ -1962,7 +1963,7 @@
           <a:p>
             <a:fld id="{90C2BA37-70E4-4B36-A435-F0D9B3E8FEAF}" type="datetimeFigureOut">
               <a:rPr lang="he-IL" smtClean="0"/>
-              <a:t>י"א/תמוז/תש"פ</a:t>
+              <a:t>י"ב/תמוז/תש"פ</a:t>
             </a:fld>
             <a:endParaRPr lang="he-IL"/>
           </a:p>
@@ -2238,7 +2239,7 @@
           <a:p>
             <a:fld id="{90C2BA37-70E4-4B36-A435-F0D9B3E8FEAF}" type="datetimeFigureOut">
               <a:rPr lang="he-IL" smtClean="0"/>
-              <a:t>י"א/תמוז/תש"פ</a:t>
+              <a:t>י"ב/תמוז/תש"פ</a:t>
             </a:fld>
             <a:endParaRPr lang="he-IL"/>
           </a:p>
@@ -2506,7 +2507,7 @@
           <a:p>
             <a:fld id="{90C2BA37-70E4-4B36-A435-F0D9B3E8FEAF}" type="datetimeFigureOut">
               <a:rPr lang="he-IL" smtClean="0"/>
-              <a:t>י"א/תמוז/תש"פ</a:t>
+              <a:t>י"ב/תמוז/תש"פ</a:t>
             </a:fld>
             <a:endParaRPr lang="he-IL"/>
           </a:p>
@@ -2921,7 +2922,7 @@
           <a:p>
             <a:fld id="{90C2BA37-70E4-4B36-A435-F0D9B3E8FEAF}" type="datetimeFigureOut">
               <a:rPr lang="he-IL" smtClean="0"/>
-              <a:t>י"א/תמוז/תש"פ</a:t>
+              <a:t>י"ב/תמוז/תש"פ</a:t>
             </a:fld>
             <a:endParaRPr lang="he-IL"/>
           </a:p>
@@ -3063,7 +3064,7 @@
           <a:p>
             <a:fld id="{90C2BA37-70E4-4B36-A435-F0D9B3E8FEAF}" type="datetimeFigureOut">
               <a:rPr lang="he-IL" smtClean="0"/>
-              <a:t>י"א/תמוז/תש"פ</a:t>
+              <a:t>י"ב/תמוז/תש"פ</a:t>
             </a:fld>
             <a:endParaRPr lang="he-IL"/>
           </a:p>
@@ -3176,7 +3177,7 @@
           <a:p>
             <a:fld id="{90C2BA37-70E4-4B36-A435-F0D9B3E8FEAF}" type="datetimeFigureOut">
               <a:rPr lang="he-IL" smtClean="0"/>
-              <a:t>י"א/תמוז/תש"פ</a:t>
+              <a:t>י"ב/תמוז/תש"פ</a:t>
             </a:fld>
             <a:endParaRPr lang="he-IL"/>
           </a:p>
@@ -3489,7 +3490,7 @@
           <a:p>
             <a:fld id="{90C2BA37-70E4-4B36-A435-F0D9B3E8FEAF}" type="datetimeFigureOut">
               <a:rPr lang="he-IL" smtClean="0"/>
-              <a:t>י"א/תמוז/תש"פ</a:t>
+              <a:t>י"ב/תמוז/תש"פ</a:t>
             </a:fld>
             <a:endParaRPr lang="he-IL"/>
           </a:p>
@@ -3778,7 +3779,7 @@
           <a:p>
             <a:fld id="{90C2BA37-70E4-4B36-A435-F0D9B3E8FEAF}" type="datetimeFigureOut">
               <a:rPr lang="he-IL" smtClean="0"/>
-              <a:t>י"א/תמוז/תש"פ</a:t>
+              <a:t>י"ב/תמוז/תש"פ</a:t>
             </a:fld>
             <a:endParaRPr lang="he-IL"/>
           </a:p>
@@ -4021,7 +4022,7 @@
           <a:p>
             <a:fld id="{90C2BA37-70E4-4B36-A435-F0D9B3E8FEAF}" type="datetimeFigureOut">
               <a:rPr lang="he-IL" smtClean="0"/>
-              <a:t>י"א/תמוז/תש"פ</a:t>
+              <a:t>י"ב/תמוז/תש"פ</a:t>
             </a:fld>
             <a:endParaRPr lang="he-IL"/>
           </a:p>
@@ -4562,6 +4563,66 @@
           <a:chExt cx="0" cy="0"/>
         </a:xfrm>
       </p:grpSpPr>
+      <p:pic>
+        <p:nvPicPr>
+          <p:cNvPr id="4" name="Picture 3">
+            <a:extLst>
+              <a:ext uri="{FF2B5EF4-FFF2-40B4-BE49-F238E27FC236}">
+                <a16:creationId xmlns:a16="http://schemas.microsoft.com/office/drawing/2014/main" id="{2F814889-8281-4B7D-B400-1C2099D76323}"/>
+              </a:ext>
+            </a:extLst>
+          </p:cNvPr>
+          <p:cNvPicPr>
+            <a:picLocks noChangeAspect="1"/>
+          </p:cNvPicPr>
+          <p:nvPr/>
+        </p:nvPicPr>
+        <p:blipFill>
+          <a:blip r:embed="rId2"/>
+          <a:stretch>
+            <a:fillRect/>
+          </a:stretch>
+        </p:blipFill>
+        <p:spPr>
+          <a:xfrm>
+            <a:off x="0" y="83890"/>
+            <a:ext cx="6754932" cy="6858000"/>
+          </a:xfrm>
+          <a:prstGeom prst="rect">
+            <a:avLst/>
+          </a:prstGeom>
+        </p:spPr>
+      </p:pic>
+    </p:spTree>
+    <p:extLst>
+      <p:ext uri="{BB962C8B-B14F-4D97-AF65-F5344CB8AC3E}">
+        <p14:creationId xmlns:p14="http://schemas.microsoft.com/office/powerpoint/2010/main" val="3062636144"/>
+      </p:ext>
+    </p:extLst>
+  </p:cSld>
+  <p:clrMapOvr>
+    <a:masterClrMapping/>
+  </p:clrMapOvr>
+</p:sld>
+</file>
+
+<file path=ppt/slides/slide11.xml><?xml version="1.0" encoding="utf-8"?>
+<p:sld xmlns:a="http://schemas.openxmlformats.org/drawingml/2006/main" xmlns:r="http://schemas.openxmlformats.org/officeDocument/2006/relationships" xmlns:p="http://schemas.openxmlformats.org/presentationml/2006/main">
+  <p:cSld>
+    <p:spTree>
+      <p:nvGrpSpPr>
+        <p:cNvPr id="1" name=""/>
+        <p:cNvGrpSpPr/>
+        <p:nvPr/>
+      </p:nvGrpSpPr>
+      <p:grpSpPr>
+        <a:xfrm>
+          <a:off x="0" y="0"/>
+          <a:ext cx="0" cy="0"/>
+          <a:chOff x="0" y="0"/>
+          <a:chExt cx="0" cy="0"/>
+        </a:xfrm>
+      </p:grpSpPr>
       <p:sp>
         <p:nvSpPr>
           <p:cNvPr id="2" name="Title 1">
@@ -4845,7 +4906,7 @@
 </p:sld>
 </file>
 
-<file path=ppt/slides/slide11.xml><?xml version="1.0" encoding="utf-8"?>
+<file path=ppt/slides/slide12.xml><?xml version="1.0" encoding="utf-8"?>
 <p:sld xmlns:a="http://schemas.openxmlformats.org/drawingml/2006/main" xmlns:r="http://schemas.openxmlformats.org/officeDocument/2006/relationships" xmlns:p="http://schemas.openxmlformats.org/presentationml/2006/main">
   <p:cSld>
     <p:spTree>
@@ -5037,7 +5098,7 @@
 </p:sld>
 </file>
 
-<file path=ppt/slides/slide12.xml><?xml version="1.0" encoding="utf-8"?>
+<file path=ppt/slides/slide13.xml><?xml version="1.0" encoding="utf-8"?>
 <p:sld xmlns:a="http://schemas.openxmlformats.org/drawingml/2006/main" xmlns:r="http://schemas.openxmlformats.org/officeDocument/2006/relationships" xmlns:p="http://schemas.openxmlformats.org/presentationml/2006/main">
   <p:cSld>
     <p:spTree>
@@ -5237,7 +5298,7 @@
 </p:sld>
 </file>
 
-<file path=ppt/slides/slide13.xml><?xml version="1.0" encoding="utf-8"?>
+<file path=ppt/slides/slide14.xml><?xml version="1.0" encoding="utf-8"?>
 <p:sld xmlns:a="http://schemas.openxmlformats.org/drawingml/2006/main" xmlns:r="http://schemas.openxmlformats.org/officeDocument/2006/relationships" xmlns:p="http://schemas.openxmlformats.org/presentationml/2006/main">
   <p:cSld>
     <p:spTree>
@@ -5429,7 +5490,7 @@
 </p:sld>
 </file>
 
-<file path=ppt/slides/slide14.xml><?xml version="1.0" encoding="utf-8"?>
+<file path=ppt/slides/slide15.xml><?xml version="1.0" encoding="utf-8"?>
 <p:sld xmlns:a="http://schemas.openxmlformats.org/drawingml/2006/main" xmlns:r="http://schemas.openxmlformats.org/officeDocument/2006/relationships" xmlns:p="http://schemas.openxmlformats.org/presentationml/2006/main">
   <p:cSld>
     <p:spTree>
@@ -5575,7 +5636,7 @@
 </p:sld>
 </file>
 
-<file path=ppt/slides/slide15.xml><?xml version="1.0" encoding="utf-8"?>
+<file path=ppt/slides/slide16.xml><?xml version="1.0" encoding="utf-8"?>
 <p:sld xmlns:a="http://schemas.openxmlformats.org/drawingml/2006/main" xmlns:r="http://schemas.openxmlformats.org/officeDocument/2006/relationships" xmlns:p="http://schemas.openxmlformats.org/presentationml/2006/main">
   <p:cSld>
     <p:spTree>
@@ -5770,7 +5831,7 @@
 </p:sld>
 </file>
 
-<file path=ppt/slides/slide16.xml><?xml version="1.0" encoding="utf-8"?>
+<file path=ppt/slides/slide17.xml><?xml version="1.0" encoding="utf-8"?>
 <p:sld xmlns:a="http://schemas.openxmlformats.org/drawingml/2006/main" xmlns:r="http://schemas.openxmlformats.org/officeDocument/2006/relationships" xmlns:p="http://schemas.openxmlformats.org/presentationml/2006/main">
   <p:cSld>
     <p:spTree>
@@ -5837,7 +5898,7 @@
 </p:sld>
 </file>
 
-<file path=ppt/slides/slide17.xml><?xml version="1.0" encoding="utf-8"?>
+<file path=ppt/slides/slide18.xml><?xml version="1.0" encoding="utf-8"?>
 <p:sld xmlns:a="http://schemas.openxmlformats.org/drawingml/2006/main" xmlns:r="http://schemas.openxmlformats.org/officeDocument/2006/relationships" xmlns:p="http://schemas.openxmlformats.org/presentationml/2006/main">
   <p:cSld>
     <p:spTree>
@@ -7742,145 +7803,42 @@
           <a:chExt cx="0" cy="0"/>
         </a:xfrm>
       </p:grpSpPr>
-      <p:sp>
-        <p:nvSpPr>
-          <p:cNvPr id="2" name="Title 1">
-            <a:extLst>
-              <a:ext uri="{FF2B5EF4-FFF2-40B4-BE49-F238E27FC236}">
-                <a16:creationId xmlns:a16="http://schemas.microsoft.com/office/drawing/2014/main" id="{3D3BA56B-DB5B-4E47-9C45-0138E32F3DF1}"/>
-              </a:ext>
-            </a:extLst>
-          </p:cNvPr>
-          <p:cNvSpPr>
-            <a:spLocks noGrp="1"/>
-          </p:cNvSpPr>
-          <p:nvPr>
-            <p:ph type="title"/>
-          </p:nvPr>
-        </p:nvSpPr>
-        <p:spPr>
-          <a:xfrm>
-            <a:off x="838200" y="681037"/>
-            <a:ext cx="10744200" cy="881063"/>
-          </a:xfrm>
-        </p:spPr>
-        <p:txBody>
-          <a:bodyPr>
-            <a:normAutofit fontScale="90000"/>
-          </a:bodyPr>
-          <a:lstStyle/>
-          <a:p>
-            <a:r>
-              <a:rPr lang="en-US" dirty="0"/>
-              <a:t>Penny Lane for quantum differentiable programming</a:t>
-            </a:r>
-            <a:br>
-              <a:rPr lang="en-US" dirty="0"/>
-            </a:br>
-            <a:endParaRPr lang="he-IL" dirty="0"/>
-          </a:p>
-        </p:txBody>
-      </p:sp>
       <p:pic>
         <p:nvPicPr>
-          <p:cNvPr id="12290" name="Picture 2">
-            <a:extLst>
-              <a:ext uri="{FF2B5EF4-FFF2-40B4-BE49-F238E27FC236}">
-                <a16:creationId xmlns:a16="http://schemas.microsoft.com/office/drawing/2014/main" id="{DE782F77-EE3E-4290-A170-C953304CA785}"/>
+          <p:cNvPr id="4" name="Content Placeholder 3">
+            <a:extLst>
+              <a:ext uri="{FF2B5EF4-FFF2-40B4-BE49-F238E27FC236}">
+                <a16:creationId xmlns:a16="http://schemas.microsoft.com/office/drawing/2014/main" id="{57DA6E2A-42F9-4939-962E-4FABC7435B60}"/>
               </a:ext>
             </a:extLst>
           </p:cNvPr>
           <p:cNvPicPr>
-            <a:picLocks noChangeAspect="1" noChangeArrowheads="1"/>
+            <a:picLocks noGrp="1" noChangeAspect="1"/>
           </p:cNvPicPr>
-          <p:nvPr/>
+          <p:nvPr>
+            <p:ph idx="1"/>
+          </p:nvPr>
         </p:nvPicPr>
         <p:blipFill>
-          <a:blip r:embed="rId2">
-            <a:extLst>
-              <a:ext uri="{28A0092B-C50C-407E-A947-70E740481C1C}">
-                <a14:useLocalDpi xmlns:a14="http://schemas.microsoft.com/office/drawing/2010/main" val="0"/>
-              </a:ext>
-            </a:extLst>
-          </a:blip>
-          <a:srcRect/>
+          <a:blip r:embed="rId2"/>
           <a:stretch>
             <a:fillRect/>
           </a:stretch>
         </p:blipFill>
-        <p:spPr bwMode="auto">
+        <p:spPr>
           <a:xfrm>
-            <a:off x="1444625" y="3429000"/>
-            <a:ext cx="4564858" cy="2536825"/>
+            <a:off x="744883" y="365125"/>
+            <a:ext cx="7397615" cy="6167650"/>
           </a:xfrm>
           <a:prstGeom prst="rect">
             <a:avLst/>
           </a:prstGeom>
-          <a:noFill/>
-          <a:extLst>
-            <a:ext uri="{909E8E84-426E-40DD-AFC4-6F175D3DCCD1}">
-              <a14:hiddenFill xmlns:a14="http://schemas.microsoft.com/office/drawing/2010/main">
-                <a:solidFill>
-                  <a:srgbClr val="FFFFFF"/>
-                </a:solidFill>
-              </a14:hiddenFill>
-            </a:ext>
-          </a:extLst>
-        </p:spPr>
-      </p:pic>
-      <p:pic>
-        <p:nvPicPr>
-          <p:cNvPr id="12294" name="Picture 6">
-            <a:extLst>
-              <a:ext uri="{FF2B5EF4-FFF2-40B4-BE49-F238E27FC236}">
-                <a16:creationId xmlns:a16="http://schemas.microsoft.com/office/drawing/2014/main" id="{C11759E9-BB1D-4FBD-A968-AAD94B607CDB}"/>
-              </a:ext>
-            </a:extLst>
-          </p:cNvPr>
-          <p:cNvPicPr>
-            <a:picLocks noGrp="1" noChangeAspect="1" noChangeArrowheads="1"/>
-          </p:cNvPicPr>
-          <p:nvPr>
-            <p:ph idx="1"/>
-          </p:nvPr>
-        </p:nvPicPr>
-        <p:blipFill>
-          <a:blip r:embed="rId3">
-            <a:extLst>
-              <a:ext uri="{28A0092B-C50C-407E-A947-70E740481C1C}">
-                <a14:useLocalDpi xmlns:a14="http://schemas.microsoft.com/office/drawing/2010/main" val="0"/>
-              </a:ext>
-            </a:extLst>
-          </a:blip>
-          <a:srcRect/>
-          <a:stretch>
-            <a:fillRect/>
-          </a:stretch>
-        </p:blipFill>
-        <p:spPr bwMode="auto">
-          <a:xfrm>
-            <a:off x="6009483" y="1885979"/>
-            <a:ext cx="3415889" cy="1409672"/>
-          </a:xfrm>
-          <a:prstGeom prst="rect">
-            <a:avLst/>
-          </a:prstGeom>
-          <a:noFill/>
-          <a:extLst>
-            <a:ext uri="{909E8E84-426E-40DD-AFC4-6F175D3DCCD1}">
-              <a14:hiddenFill xmlns:a14="http://schemas.microsoft.com/office/drawing/2010/main">
-                <a:solidFill>
-                  <a:srgbClr val="FFFFFF"/>
-                </a:solidFill>
-              </a14:hiddenFill>
-            </a:ext>
-          </a:extLst>
         </p:spPr>
       </p:pic>
     </p:spTree>
     <p:extLst>
       <p:ext uri="{BB962C8B-B14F-4D97-AF65-F5344CB8AC3E}">
-        <p14:creationId xmlns:p14="http://schemas.microsoft.com/office/powerpoint/2010/main" val="2163068019"/>
+        <p14:creationId xmlns:p14="http://schemas.microsoft.com/office/powerpoint/2010/main" val="3794603533"/>
       </p:ext>
     </p:extLst>
   </p:cSld>

</xml_diff>